<commit_message>
Compte rendu - Matrice obj et SMART
</commit_message>
<xml_diff>
--- a/doc/livrable_1/rapport/templates/WBS.pptx
+++ b/doc/livrable_1/rapport/templates/WBS.pptx
@@ -5242,7 +5242,7 @@
               <a:buNone/>
             </a:pPr>
             <a:r>
-              <a:rPr lang="fr" b="1" dirty="0">
+              <a:rPr lang="fr" sz="1800" b="1" dirty="0">
                 <a:solidFill>
                   <a:srgbClr val="4A86E8"/>
                 </a:solidFill>
@@ -5300,10 +5300,10 @@
               <a:buNone/>
             </a:pPr>
             <a:r>
-              <a:rPr lang="fr-FR" sz="1000" dirty="0"/>
+              <a:rPr lang="fr-FR" sz="1200" dirty="0"/>
               <a:t>Définition du cadre</a:t>
             </a:r>
-            <a:endParaRPr sz="1000" dirty="0"/>
+            <a:endParaRPr sz="1200" dirty="0"/>
           </a:p>
         </p:txBody>
       </p:sp>
@@ -5350,10 +5350,10 @@
               <a:buNone/>
             </a:pPr>
             <a:r>
-              <a:rPr lang="fr-FR" sz="800" dirty="0"/>
+              <a:rPr lang="fr-FR" sz="1000" spc="-10" dirty="0"/>
               <a:t>Brainstorming</a:t>
             </a:r>
-            <a:endParaRPr sz="800" dirty="0"/>
+            <a:endParaRPr sz="1000" spc="-10" dirty="0"/>
           </a:p>
         </p:txBody>
       </p:sp>
@@ -5400,10 +5400,10 @@
               <a:buNone/>
             </a:pPr>
             <a:r>
-              <a:rPr lang="fr-FR" sz="800" dirty="0"/>
+              <a:rPr lang="fr-FR" sz="1000" dirty="0"/>
               <a:t>Recherches</a:t>
             </a:r>
-            <a:endParaRPr sz="800" dirty="0"/>
+            <a:endParaRPr sz="1000" dirty="0"/>
           </a:p>
         </p:txBody>
       </p:sp>
@@ -5450,10 +5450,10 @@
               <a:buNone/>
             </a:pPr>
             <a:r>
-              <a:rPr lang="fr-FR" sz="800" dirty="0"/>
+              <a:rPr lang="fr-FR" sz="1000" dirty="0"/>
               <a:t>Synthèse</a:t>
             </a:r>
-            <a:endParaRPr sz="800" dirty="0"/>
+            <a:endParaRPr sz="1000" dirty="0"/>
           </a:p>
         </p:txBody>
       </p:sp>
@@ -5500,10 +5500,10 @@
               <a:buNone/>
             </a:pPr>
             <a:r>
-              <a:rPr lang="fr-FR" sz="800" dirty="0"/>
+              <a:rPr lang="fr-FR" sz="1000" spc="-20" dirty="0"/>
               <a:t>Définition fonctionnalités</a:t>
             </a:r>
-            <a:endParaRPr sz="800" dirty="0"/>
+            <a:endParaRPr sz="1000" spc="-20" dirty="0"/>
           </a:p>
         </p:txBody>
       </p:sp>
@@ -5550,10 +5550,10 @@
               <a:buNone/>
             </a:pPr>
             <a:r>
-              <a:rPr lang="fr-FR" sz="800" dirty="0"/>
+              <a:rPr lang="fr-FR" sz="1000" dirty="0"/>
               <a:t>Présentation professeurs</a:t>
             </a:r>
-            <a:endParaRPr sz="800" dirty="0"/>
+            <a:endParaRPr sz="1000" dirty="0"/>
           </a:p>
         </p:txBody>
       </p:sp>
@@ -5600,10 +5600,10 @@
               <a:buNone/>
             </a:pPr>
             <a:r>
-              <a:rPr lang="fr-FR" sz="1000" dirty="0"/>
+              <a:rPr lang="fr-FR" sz="1200" dirty="0"/>
               <a:t>Développement application</a:t>
             </a:r>
-            <a:endParaRPr sz="1000" dirty="0"/>
+            <a:endParaRPr sz="1200" dirty="0"/>
           </a:p>
         </p:txBody>
       </p:sp>
@@ -5650,10 +5650,10 @@
               <a:buNone/>
             </a:pPr>
             <a:r>
-              <a:rPr lang="fr-FR" sz="800" dirty="0"/>
-              <a:t>Partie client</a:t>
+              <a:rPr lang="fr-FR" sz="1200" dirty="0"/>
+              <a:t>Frontend</a:t>
             </a:r>
-            <a:endParaRPr sz="800" dirty="0"/>
+            <a:endParaRPr sz="1000" dirty="0"/>
           </a:p>
         </p:txBody>
       </p:sp>
@@ -5700,7 +5700,7 @@
               <a:buNone/>
             </a:pPr>
             <a:r>
-              <a:rPr lang="fr-FR" sz="1000" dirty="0"/>
+              <a:rPr lang="fr-FR" sz="1200" dirty="0"/>
               <a:t>Rapport</a:t>
             </a:r>
             <a:endParaRPr sz="1000" dirty="0"/>
@@ -5942,7 +5942,7 @@
               <a:buNone/>
             </a:pPr>
             <a:r>
-              <a:rPr lang="fr-FR" sz="800" dirty="0" err="1"/>
+              <a:rPr lang="fr-FR" sz="1200" dirty="0" err="1"/>
               <a:t>Database</a:t>
             </a:r>
             <a:endParaRPr sz="800" dirty="0"/>
@@ -5984,9 +5984,10 @@
           <a:p>
             <a:pPr algn="ctr"/>
             <a:r>
-              <a:rPr lang="fr-FR" sz="800" dirty="0"/>
-              <a:t>Python</a:t>
+              <a:rPr lang="fr-FR" sz="1200" dirty="0"/>
+              <a:t>Backend</a:t>
             </a:r>
+            <a:endParaRPr lang="fr-FR" sz="800" dirty="0"/>
           </a:p>
         </p:txBody>
       </p:sp>
@@ -6033,10 +6034,10 @@
               <a:buNone/>
             </a:pPr>
             <a:r>
-              <a:rPr lang="fr-FR" sz="800" dirty="0"/>
+              <a:rPr lang="fr-FR" sz="1000" dirty="0"/>
               <a:t>Schéma relationnel</a:t>
             </a:r>
-            <a:endParaRPr sz="800" dirty="0"/>
+            <a:endParaRPr sz="1000" dirty="0"/>
           </a:p>
         </p:txBody>
       </p:sp>
@@ -6173,10 +6174,10 @@
               <a:buNone/>
             </a:pPr>
             <a:r>
-              <a:rPr lang="fr-FR" sz="800" dirty="0"/>
+              <a:rPr lang="fr-FR" sz="1000" dirty="0"/>
               <a:t>Conception des requêtes</a:t>
             </a:r>
-            <a:endParaRPr sz="800" dirty="0"/>
+            <a:endParaRPr sz="1000" dirty="0"/>
           </a:p>
         </p:txBody>
       </p:sp>
@@ -6223,10 +6224,10 @@
               <a:buNone/>
             </a:pPr>
             <a:r>
-              <a:rPr lang="fr-FR" sz="800" dirty="0"/>
-              <a:t>Flask / Partie serveur</a:t>
+              <a:rPr lang="fr-FR" sz="1000" dirty="0"/>
+              <a:t>Flask</a:t>
             </a:r>
-            <a:endParaRPr sz="800" dirty="0"/>
+            <a:endParaRPr sz="1000" dirty="0"/>
           </a:p>
         </p:txBody>
       </p:sp>
@@ -6627,14 +6628,14 @@
               <a:buNone/>
             </a:pPr>
             <a:r>
-              <a:rPr lang="fr-FR" sz="800" dirty="0"/>
+              <a:rPr lang="fr-FR" sz="1000" dirty="0"/>
               <a:t>Next/</a:t>
             </a:r>
             <a:r>
-              <a:rPr lang="fr-FR" sz="800" dirty="0" err="1"/>
+              <a:rPr lang="fr-FR" sz="1000" dirty="0" err="1"/>
               <a:t>React</a:t>
             </a:r>
-            <a:endParaRPr sz="800" dirty="0"/>
+            <a:endParaRPr sz="1000" dirty="0"/>
           </a:p>
         </p:txBody>
       </p:sp>
@@ -6687,7 +6688,7 @@
               <a:buNone/>
             </a:pPr>
             <a:r>
-              <a:rPr lang="fr-FR" sz="800" dirty="0"/>
+              <a:rPr lang="fr-FR" sz="1000" dirty="0"/>
               <a:t>CSS</a:t>
             </a:r>
             <a:endParaRPr sz="800" dirty="0"/>
@@ -6743,8 +6744,8 @@
               <a:buNone/>
             </a:pPr>
             <a:r>
-              <a:rPr lang="fr-FR" sz="800" dirty="0"/>
-              <a:t>HTML</a:t>
+              <a:rPr lang="fr-FR" sz="1000" dirty="0"/>
+              <a:t>JSX</a:t>
             </a:r>
             <a:endParaRPr sz="800" dirty="0"/>
           </a:p>

</xml_diff>